<commit_message>
Add new requirements presentation and backup diagram file
</commit_message>
<xml_diff>
--- a/figures/framework design/Requirements.pptx
+++ b/figures/framework design/Requirements.pptx
@@ -1458,18 +1458,11 @@
         <a:lstStyle/>
         <a:p>
           <a:r>
-            <a:rPr lang="en-GB" sz="1200" noProof="0">
-              <a:latin typeface="Times New Roman" panose="02020603050405020304" pitchFamily="18" charset="0"/>
-              <a:cs typeface="Times New Roman" panose="02020603050405020304" pitchFamily="18" charset="0"/>
-            </a:rPr>
-            <a:t>Resilience </a:t>
-          </a:r>
-          <a:r>
             <a:rPr lang="en-GB" sz="1200" noProof="0" dirty="0">
               <a:latin typeface="Times New Roman" panose="02020603050405020304" pitchFamily="18" charset="0"/>
               <a:cs typeface="Times New Roman" panose="02020603050405020304" pitchFamily="18" charset="0"/>
             </a:rPr>
-            <a:t>against Uncertainty</a:t>
+            <a:t>Resilience against Uncertainty</a:t>
           </a:r>
         </a:p>
       </dgm:t>
@@ -4489,18 +4482,11 @@
             <a:buNone/>
           </a:pPr>
           <a:r>
-            <a:rPr lang="en-GB" sz="1200" kern="1200" noProof="0">
-              <a:latin typeface="Times New Roman" panose="02020603050405020304" pitchFamily="18" charset="0"/>
-              <a:cs typeface="Times New Roman" panose="02020603050405020304" pitchFamily="18" charset="0"/>
-            </a:rPr>
-            <a:t>Resilience </a:t>
-          </a:r>
-          <a:r>
             <a:rPr lang="en-GB" sz="1200" kern="1200" noProof="0" dirty="0">
               <a:latin typeface="Times New Roman" panose="02020603050405020304" pitchFamily="18" charset="0"/>
               <a:cs typeface="Times New Roman" panose="02020603050405020304" pitchFamily="18" charset="0"/>
             </a:rPr>
-            <a:t>against Uncertainty</a:t>
+            <a:t>Resilience against Uncertainty</a:t>
           </a:r>
         </a:p>
       </dsp:txBody>
@@ -11888,7 +11874,7 @@
           <p:nvPr>
             <p:extLst>
               <p:ext uri="{D42A27DB-BD31-4B8C-83A1-F6EECF244321}">
-                <p14:modId xmlns:p14="http://schemas.microsoft.com/office/powerpoint/2010/main" val="1655083499"/>
+                <p14:modId xmlns:p14="http://schemas.microsoft.com/office/powerpoint/2010/main" val="4114719584"/>
               </p:ext>
             </p:extLst>
           </p:nvPr>

</xml_diff>